<commit_message>
Mini project for hospital management
</commit_message>
<xml_diff>
--- a/Mini Project/hospital-management-system/HospitalManagement.pptx
+++ b/Mini Project/hospital-management-system/HospitalManagement.pptx
@@ -20,6 +20,7 @@
     <p:sldId id="268" r:id="rId14"/>
     <p:sldId id="269" r:id="rId15"/>
     <p:sldId id="270" r:id="rId16"/>
+    <p:sldId id="271" r:id="rId17"/>
   </p:sldIdLst>
   <p:sldSz cx="9144000" cy="6858000" type="screen4x3"/>
   <p:notesSz cx="6858000" cy="9144000"/>
@@ -5666,15 +5667,7 @@
           <a:p>
             <a:r>
               <a:rPr lang="en-US" dirty="0" smtClean="0"/>
-              <a:t>Also useful </a:t>
-            </a:r>
-            <a:r>
-              <a:rPr lang="en-US" dirty="0" smtClean="0"/>
-              <a:t>for the patients who are unable to go to hospital</a:t>
-            </a:r>
-            <a:r>
-              <a:rPr lang="en-US" dirty="0" smtClean="0"/>
-              <a:t>.</a:t>
+              <a:t>Also useful for the patients who are unable to go to hospital.</a:t>
             </a:r>
           </a:p>
           <a:p>
@@ -5688,14 +5681,12 @@
               <a:rPr lang="en-US" dirty="0" smtClean="0"/>
               <a:t>Use case 2</a:t>
             </a:r>
-            <a:endParaRPr lang="en-US" dirty="0" smtClean="0"/>
           </a:p>
           <a:p>
             <a:r>
               <a:rPr lang="en-US" dirty="0" smtClean="0"/>
               <a:t>Hospital management to have records of all the appointments as well as prescription given by doctor along with patient details.</a:t>
             </a:r>
-            <a:endParaRPr lang="en-US" dirty="0" smtClean="0"/>
           </a:p>
           <a:p>
             <a:pPr>
@@ -5783,11 +5774,7 @@
           <a:p>
             <a:r>
               <a:rPr lang="en-US" dirty="0" smtClean="0"/>
-              <a:t>The tool used for testing is SonarLint</a:t>
-            </a:r>
-            <a:r>
-              <a:rPr lang="en-US" dirty="0" smtClean="0"/>
-              <a:t>.</a:t>
+              <a:t>The tool used for testing is SonarLint.</a:t>
             </a:r>
           </a:p>
           <a:p>
@@ -5802,11 +5789,7 @@
             </a:pPr>
             <a:r>
               <a:rPr lang="en-US" dirty="0" smtClean="0"/>
-              <a:t> </a:t>
-            </a:r>
-            <a:r>
-              <a:rPr lang="en-US" dirty="0" smtClean="0"/>
-              <a:t>            Class     -   100%</a:t>
+              <a:t>             Class     -   100%</a:t>
             </a:r>
           </a:p>
           <a:p>
@@ -5815,11 +5798,7 @@
             </a:pPr>
             <a:r>
               <a:rPr lang="en-US" dirty="0" smtClean="0"/>
-              <a:t> </a:t>
-            </a:r>
-            <a:r>
-              <a:rPr lang="en-US" dirty="0" smtClean="0"/>
-              <a:t>            Method  -    81%</a:t>
+              <a:t>             Method  -    81%</a:t>
             </a:r>
           </a:p>
           <a:p>
@@ -5828,19 +5807,101 @@
             </a:pPr>
             <a:r>
               <a:rPr lang="en-US" dirty="0" smtClean="0"/>
-              <a:t> </a:t>
-            </a:r>
-            <a:r>
-              <a:rPr lang="en-US" dirty="0" smtClean="0"/>
-              <a:t>            Line       -    86%</a:t>
-            </a:r>
-            <a:endParaRPr lang="en-US" dirty="0" smtClean="0"/>
+              <a:t>             Line       -    86%</a:t>
+            </a:r>
           </a:p>
           <a:p>
             <a:endParaRPr lang="en-US" dirty="0"/>
           </a:p>
         </p:txBody>
       </p:sp>
+    </p:spTree>
+  </p:cSld>
+  <p:clrMapOvr>
+    <a:masterClrMapping/>
+  </p:clrMapOvr>
+</p:sld>
+</file>
+
+<file path=ppt/slides/slide16.xml><?xml version="1.0" encoding="utf-8"?>
+<p:sld xmlns:a="http://schemas.openxmlformats.org/drawingml/2006/main" xmlns:r="http://schemas.openxmlformats.org/officeDocument/2006/relationships" xmlns:p="http://schemas.openxmlformats.org/presentationml/2006/main">
+  <p:cSld>
+    <p:spTree>
+      <p:nvGrpSpPr>
+        <p:cNvPr id="1" name=""/>
+        <p:cNvGrpSpPr/>
+        <p:nvPr/>
+      </p:nvGrpSpPr>
+      <p:grpSpPr>
+        <a:xfrm>
+          <a:off x="0" y="0"/>
+          <a:ext cx="0" cy="0"/>
+          <a:chOff x="0" y="0"/>
+          <a:chExt cx="0" cy="0"/>
+        </a:xfrm>
+      </p:grpSpPr>
+      <p:pic>
+        <p:nvPicPr>
+          <p:cNvPr id="4" name="Content Placeholder 3">
+            <a:extLst>
+              <a:ext uri="{FF2B5EF4-FFF2-40B4-BE49-F238E27FC236}">
+                <a16:creationId xmlns:a16="http://schemas.microsoft.com/office/drawing/2014/main" xmlns:lc="http://schemas.openxmlformats.org/drawingml/2006/lockedCanvas" xmlns="" id="{277669B9-CA07-AFCC-6C10-EEE2B2188A8D}"/>
+              </a:ext>
+            </a:extLst>
+          </p:cNvPr>
+          <p:cNvPicPr>
+            <a:picLocks noGrp="1" noChangeAspect="1" noChangeArrowheads="1"/>
+          </p:cNvPicPr>
+          <p:nvPr>
+            <p:ph sz="quarter" idx="1"/>
+          </p:nvPr>
+        </p:nvPicPr>
+        <p:blipFill>
+          <a:blip r:embed="rId2" cstate="print">
+            <a:extLst>
+              <a:ext uri="{28A0092B-C50C-407E-A947-70E740481C1C}">
+                <a14:useLocalDpi xmlns:a14="http://schemas.microsoft.com/office/drawing/2010/main" xmlns:lc="http://schemas.openxmlformats.org/drawingml/2006/lockedCanvas" xmlns="" val="0"/>
+              </a:ext>
+            </a:extLst>
+          </a:blip>
+          <a:srcRect/>
+          <a:stretch>
+            <a:fillRect/>
+          </a:stretch>
+        </p:blipFill>
+        <p:spPr bwMode="auto">
+          <a:xfrm>
+            <a:off x="762000" y="914400"/>
+            <a:ext cx="7312329" cy="4873625"/>
+          </a:xfrm>
+          <a:prstGeom prst="rect">
+            <a:avLst/>
+          </a:prstGeom>
+          <a:noFill/>
+          <a:ln>
+            <a:noFill/>
+          </a:ln>
+          <a:extLst>
+            <a:ext uri="{909E8E84-426E-40DD-AFC4-6F175D3DCCD1}">
+              <a14:hiddenFill xmlns:a14="http://schemas.microsoft.com/office/drawing/2010/main" xmlns:lc="http://schemas.openxmlformats.org/drawingml/2006/lockedCanvas" xmlns="">
+                <a:solidFill>
+                  <a:srgbClr val="FFFFFF"/>
+                </a:solidFill>
+              </a14:hiddenFill>
+            </a:ext>
+            <a:ext uri="{91240B29-F687-4F45-9708-019B960494DF}">
+              <a14:hiddenLine xmlns:a14="http://schemas.microsoft.com/office/drawing/2010/main" xmlns:lc="http://schemas.openxmlformats.org/drawingml/2006/lockedCanvas" xmlns="" w="9525">
+                <a:solidFill>
+                  <a:srgbClr val="000000"/>
+                </a:solidFill>
+                <a:miter lim="800000"/>
+                <a:headEnd/>
+                <a:tailEnd/>
+              </a14:hiddenLine>
+            </a:ext>
+          </a:extLst>
+        </p:spPr>
+      </p:pic>
     </p:spTree>
   </p:cSld>
   <p:clrMapOvr>
@@ -6098,19 +6159,7 @@
               <a:rPr lang="en-US" altLang="en-US" dirty="0" smtClean="0">
                 <a:latin typeface="Goudy Old Style" panose="02020502050305020303" pitchFamily="18" charset="0"/>
               </a:rPr>
-              <a:t>    - Doctors look into the appointments they had </a:t>
-            </a:r>
-            <a:r>
-              <a:rPr lang="en-US" altLang="en-US" dirty="0" smtClean="0">
-                <a:latin typeface="Goudy Old Style" panose="02020502050305020303" pitchFamily="18" charset="0"/>
-              </a:rPr>
-              <a:t>          appointed</a:t>
-            </a:r>
-            <a:r>
-              <a:rPr lang="en-US" altLang="en-US" dirty="0" smtClean="0">
-                <a:latin typeface="Goudy Old Style" panose="02020502050305020303" pitchFamily="18" charset="0"/>
-              </a:rPr>
-              <a:t>.</a:t>
+              <a:t>    - Doctors look into the appointments they had           appointed.</a:t>
             </a:r>
           </a:p>
           <a:p>
@@ -6437,14 +6486,7 @@
                 <a:latin typeface="Goudy Old Style" panose="02020502050305020303" pitchFamily="18" charset="0"/>
                 <a:cs typeface="Times New Roman" panose="02020603050405020304" pitchFamily="18" charset="0"/>
               </a:rPr>
-              <a:t>Doctor </a:t>
-            </a:r>
-            <a:r>
-              <a:rPr lang="en-US" dirty="0" smtClean="0">
-                <a:latin typeface="Goudy Old Style" panose="02020502050305020303" pitchFamily="18" charset="0"/>
-                <a:cs typeface="Times New Roman" panose="02020603050405020304" pitchFamily="18" charset="0"/>
-              </a:rPr>
-              <a:t>and patient can view their respective appointments.</a:t>
+              <a:t>Doctor and patient can view their respective appointments.</a:t>
             </a:r>
           </a:p>
           <a:p>

</xml_diff>

<commit_message>
Mini project for hospital management with presentation
</commit_message>
<xml_diff>
--- a/Mini Project/hospital-management-system/HospitalManagement.pptx
+++ b/Mini Project/hospital-management-system/HospitalManagement.pptx
@@ -17,10 +17,15 @@
     <p:sldId id="265" r:id="rId11"/>
     <p:sldId id="266" r:id="rId12"/>
     <p:sldId id="267" r:id="rId13"/>
-    <p:sldId id="268" r:id="rId14"/>
-    <p:sldId id="269" r:id="rId15"/>
-    <p:sldId id="270" r:id="rId16"/>
-    <p:sldId id="271" r:id="rId17"/>
+    <p:sldId id="272" r:id="rId14"/>
+    <p:sldId id="273" r:id="rId15"/>
+    <p:sldId id="274" r:id="rId16"/>
+    <p:sldId id="268" r:id="rId17"/>
+    <p:sldId id="269" r:id="rId18"/>
+    <p:sldId id="270" r:id="rId19"/>
+    <p:sldId id="275" r:id="rId20"/>
+    <p:sldId id="276" r:id="rId21"/>
+    <p:sldId id="271" r:id="rId22"/>
   </p:sldIdLst>
   <p:sldSz cx="9144000" cy="6858000" type="screen4x3"/>
   <p:notesSz cx="6858000" cy="9144000"/>
@@ -5534,7 +5539,7 @@
                   <a:schemeClr val="tx1"/>
                 </a:solidFill>
               </a:rPr>
-              <a:t>Architecture</a:t>
+              <a:t>Postman</a:t>
             </a:r>
             <a:endParaRPr lang="en-US" dirty="0">
               <a:solidFill>
@@ -5544,15 +5549,57 @@
           </a:p>
         </p:txBody>
       </p:sp>
+      <p:sp>
+        <p:nvSpPr>
+          <p:cNvPr id="3" name="Content Placeholder 2"/>
+          <p:cNvSpPr>
+            <a:spLocks noGrp="1"/>
+          </p:cNvSpPr>
+          <p:nvPr>
+            <p:ph sz="quarter" idx="1"/>
+          </p:nvPr>
+        </p:nvSpPr>
+        <p:spPr>
+          <a:xfrm>
+            <a:off x="457200" y="1600200"/>
+            <a:ext cx="7467600" cy="2057400"/>
+          </a:xfrm>
+        </p:spPr>
+        <p:txBody>
+          <a:bodyPr>
+            <a:normAutofit/>
+          </a:bodyPr>
+          <a:lstStyle/>
+          <a:p>
+            <a:r>
+              <a:rPr lang="en-US" sz="2000" dirty="0" smtClean="0"/>
+              <a:t>Postman is an API platform for building and using</a:t>
+            </a:r>
+          </a:p>
+          <a:p>
+            <a:pPr>
+              <a:buNone/>
+            </a:pPr>
+            <a:r>
+              <a:rPr lang="en-US" sz="2000" dirty="0" smtClean="0"/>
+              <a:t>    APIs. Postman simplifies each step of the API lifecycle and streamlines collaboration so you can create better APIs—faster. A comprehensive set of tools that help accelerate the API Lifecycle - from design, testing, documentation, and mocking to discovery.</a:t>
+            </a:r>
+          </a:p>
+          <a:p>
+            <a:pPr>
+              <a:buNone/>
+            </a:pPr>
+            <a:endParaRPr lang="en-US" sz="2000" dirty="0"/>
+          </a:p>
+        </p:txBody>
+      </p:sp>
       <p:pic>
         <p:nvPicPr>
-          <p:cNvPr id="1027" name="Picture 3"/>
+          <p:cNvPr id="1026" name="Picture 2" descr="C:\Users\sfjbs\Downloads\postman.png"/>
           <p:cNvPicPr>
-            <a:picLocks noGrp="1" noChangeAspect="1" noChangeArrowheads="1"/>
+            <a:picLocks noChangeAspect="1" noChangeArrowheads="1"/>
           </p:cNvPicPr>
-          <p:nvPr>
-            <p:ph sz="quarter" idx="1"/>
-          </p:nvPr>
+          <p:nvPr/>
         </p:nvPicPr>
         <p:blipFill>
           <a:blip r:embed="rId2"/>
@@ -5563,20 +5610,13 @@
         </p:blipFill>
         <p:spPr bwMode="auto">
           <a:xfrm>
-            <a:off x="762000" y="1807400"/>
-            <a:ext cx="6858000" cy="4459224"/>
+            <a:off x="2438400" y="3733800"/>
+            <a:ext cx="3352801" cy="2438400"/>
           </a:xfrm>
           <a:prstGeom prst="rect">
             <a:avLst/>
           </a:prstGeom>
           <a:noFill/>
-          <a:ln w="9525">
-            <a:noFill/>
-            <a:miter lim="800000"/>
-            <a:headEnd/>
-            <a:tailEnd/>
-          </a:ln>
-          <a:effectLst/>
         </p:spPr>
       </p:pic>
     </p:spTree>
@@ -5604,98 +5644,41 @@
           <a:chExt cx="0" cy="0"/>
         </a:xfrm>
       </p:grpSpPr>
-      <p:sp>
-        <p:nvSpPr>
-          <p:cNvPr id="2" name="Title 1"/>
-          <p:cNvSpPr>
-            <a:spLocks noGrp="1"/>
-          </p:cNvSpPr>
-          <p:nvPr>
-            <p:ph type="title"/>
-          </p:nvPr>
-        </p:nvSpPr>
-        <p:spPr/>
-        <p:txBody>
-          <a:bodyPr/>
-          <a:lstStyle/>
-          <a:p>
-            <a:r>
-              <a:rPr lang="en-US" dirty="0" smtClean="0">
-                <a:solidFill>
-                  <a:schemeClr val="tx1"/>
-                </a:solidFill>
-              </a:rPr>
-              <a:t>Use Case</a:t>
-            </a:r>
-            <a:endParaRPr lang="en-US" dirty="0">
-              <a:solidFill>
-                <a:schemeClr val="tx1"/>
-              </a:solidFill>
-            </a:endParaRPr>
-          </a:p>
-        </p:txBody>
-      </p:sp>
-      <p:sp>
-        <p:nvSpPr>
-          <p:cNvPr id="3" name="Content Placeholder 2"/>
-          <p:cNvSpPr>
-            <a:spLocks noGrp="1"/>
-          </p:cNvSpPr>
+      <p:pic>
+        <p:nvPicPr>
+          <p:cNvPr id="2051" name="Picture 3"/>
+          <p:cNvPicPr>
+            <a:picLocks noGrp="1" noChangeAspect="1" noChangeArrowheads="1"/>
+          </p:cNvPicPr>
           <p:nvPr>
             <p:ph sz="quarter" idx="1"/>
           </p:nvPr>
-        </p:nvSpPr>
-        <p:spPr/>
-        <p:txBody>
-          <a:bodyPr/>
-          <a:lstStyle/>
-          <a:p>
-            <a:pPr>
-              <a:buNone/>
-            </a:pPr>
-            <a:r>
-              <a:rPr lang="en-US" dirty="0" smtClean="0"/>
-              <a:t>Use case 1</a:t>
-            </a:r>
-          </a:p>
-          <a:p>
-            <a:r>
-              <a:rPr lang="en-US" dirty="0" smtClean="0"/>
-              <a:t>Patients to keep thier records of all appointments.</a:t>
-            </a:r>
-          </a:p>
-          <a:p>
-            <a:r>
-              <a:rPr lang="en-US" dirty="0" smtClean="0"/>
-              <a:t>Also useful for the patients who are unable to go to hospital.</a:t>
-            </a:r>
-          </a:p>
-          <a:p>
-            <a:endParaRPr lang="en-US" dirty="0" smtClean="0"/>
-          </a:p>
-          <a:p>
-            <a:pPr>
-              <a:buNone/>
-            </a:pPr>
-            <a:r>
-              <a:rPr lang="en-US" dirty="0" smtClean="0"/>
-              <a:t>Use case 2</a:t>
-            </a:r>
-          </a:p>
-          <a:p>
-            <a:r>
-              <a:rPr lang="en-US" dirty="0" smtClean="0"/>
-              <a:t>Hospital management to have records of all the appointments as well as prescription given by doctor along with patient details.</a:t>
-            </a:r>
-          </a:p>
-          <a:p>
-            <a:pPr>
-              <a:buNone/>
-            </a:pPr>
-            <a:endParaRPr lang="en-US" dirty="0" smtClean="0"/>
-          </a:p>
-        </p:txBody>
-      </p:sp>
+        </p:nvPicPr>
+        <p:blipFill>
+          <a:blip r:embed="rId2"/>
+          <a:srcRect/>
+          <a:stretch>
+            <a:fillRect/>
+          </a:stretch>
+        </p:blipFill>
+        <p:spPr bwMode="auto">
+          <a:xfrm>
+            <a:off x="685800" y="1219200"/>
+            <a:ext cx="7467600" cy="4200525"/>
+          </a:xfrm>
+          <a:prstGeom prst="rect">
+            <a:avLst/>
+          </a:prstGeom>
+          <a:noFill/>
+          <a:ln w="9525">
+            <a:noFill/>
+            <a:miter lim="800000"/>
+            <a:headEnd/>
+            <a:tailEnd/>
+          </a:ln>
+          <a:effectLst/>
+        </p:spPr>
+      </p:pic>
     </p:spTree>
   </p:cSld>
   <p:clrMapOvr>
@@ -5721,100 +5704,34 @@
           <a:chExt cx="0" cy="0"/>
         </a:xfrm>
       </p:grpSpPr>
-      <p:sp>
-        <p:nvSpPr>
-          <p:cNvPr id="2" name="Title 1"/>
-          <p:cNvSpPr>
-            <a:spLocks noGrp="1"/>
-          </p:cNvSpPr>
-          <p:nvPr>
-            <p:ph type="title"/>
-          </p:nvPr>
-        </p:nvSpPr>
-        <p:spPr/>
-        <p:txBody>
-          <a:bodyPr/>
-          <a:lstStyle/>
-          <a:p>
-            <a:r>
-              <a:rPr lang="en-US" dirty="0" smtClean="0">
-                <a:solidFill>
-                  <a:schemeClr val="tx1"/>
-                </a:solidFill>
-              </a:rPr>
-              <a:t>Testing</a:t>
-            </a:r>
-            <a:endParaRPr lang="en-US" dirty="0">
-              <a:solidFill>
-                <a:schemeClr val="tx1"/>
-              </a:solidFill>
-            </a:endParaRPr>
-          </a:p>
-        </p:txBody>
-      </p:sp>
-      <p:sp>
-        <p:nvSpPr>
-          <p:cNvPr id="3" name="Content Placeholder 2"/>
-          <p:cNvSpPr>
-            <a:spLocks noGrp="1"/>
-          </p:cNvSpPr>
+      <p:pic>
+        <p:nvPicPr>
+          <p:cNvPr id="3074" name="Picture 2" descr="C:\Users\sfjbs\Pictures\Screenshots\Screenshot (11).png"/>
+          <p:cNvPicPr>
+            <a:picLocks noGrp="1" noChangeAspect="1" noChangeArrowheads="1"/>
+          </p:cNvPicPr>
           <p:nvPr>
             <p:ph sz="quarter" idx="1"/>
           </p:nvPr>
-        </p:nvSpPr>
-        <p:spPr>
-          <a:xfrm>
-            <a:off x="1066800" y="1905000"/>
-            <a:ext cx="6400800" cy="4267200"/>
-          </a:xfrm>
-        </p:spPr>
-        <p:txBody>
-          <a:bodyPr/>
-          <a:lstStyle/>
-          <a:p>
-            <a:r>
-              <a:rPr lang="en-US" dirty="0" smtClean="0"/>
-              <a:t>The tool used for testing is SonarLint.</a:t>
-            </a:r>
-          </a:p>
-          <a:p>
-            <a:r>
-              <a:rPr lang="en-US" dirty="0" smtClean="0"/>
-              <a:t>The code coverage is-</a:t>
-            </a:r>
-          </a:p>
-          <a:p>
-            <a:pPr>
-              <a:buNone/>
-            </a:pPr>
-            <a:r>
-              <a:rPr lang="en-US" dirty="0" smtClean="0"/>
-              <a:t>             Class     -   100%</a:t>
-            </a:r>
-          </a:p>
-          <a:p>
-            <a:pPr>
-              <a:buNone/>
-            </a:pPr>
-            <a:r>
-              <a:rPr lang="en-US" dirty="0" smtClean="0"/>
-              <a:t>             Method  -    81%</a:t>
-            </a:r>
-          </a:p>
-          <a:p>
-            <a:pPr>
-              <a:buNone/>
-            </a:pPr>
-            <a:r>
-              <a:rPr lang="en-US" dirty="0" smtClean="0"/>
-              <a:t>             Line       -    86%</a:t>
-            </a:r>
-          </a:p>
-          <a:p>
-            <a:endParaRPr lang="en-US" dirty="0"/>
-          </a:p>
-        </p:txBody>
-      </p:sp>
+        </p:nvPicPr>
+        <p:blipFill>
+          <a:blip r:embed="rId2"/>
+          <a:srcRect/>
+          <a:stretch>
+            <a:fillRect/>
+          </a:stretch>
+        </p:blipFill>
+        <p:spPr bwMode="auto">
+          <a:xfrm>
+            <a:off x="762000" y="1143000"/>
+            <a:ext cx="7467600" cy="4200525"/>
+          </a:xfrm>
+          <a:prstGeom prst="rect">
+            <a:avLst/>
+          </a:prstGeom>
+          <a:noFill/>
+        </p:spPr>
+      </p:pic>
     </p:spTree>
   </p:cSld>
   <p:clrMapOvr>
@@ -5824,6 +5741,621 @@
 </file>
 
 <file path=ppt/slides/slide16.xml><?xml version="1.0" encoding="utf-8"?>
+<p:sld xmlns:a="http://schemas.openxmlformats.org/drawingml/2006/main" xmlns:r="http://schemas.openxmlformats.org/officeDocument/2006/relationships" xmlns:p="http://schemas.openxmlformats.org/presentationml/2006/main">
+  <p:cSld>
+    <p:spTree>
+      <p:nvGrpSpPr>
+        <p:cNvPr id="1" name=""/>
+        <p:cNvGrpSpPr/>
+        <p:nvPr/>
+      </p:nvGrpSpPr>
+      <p:grpSpPr>
+        <a:xfrm>
+          <a:off x="0" y="0"/>
+          <a:ext cx="0" cy="0"/>
+          <a:chOff x="0" y="0"/>
+          <a:chExt cx="0" cy="0"/>
+        </a:xfrm>
+      </p:grpSpPr>
+      <p:sp>
+        <p:nvSpPr>
+          <p:cNvPr id="2" name="Title 1"/>
+          <p:cNvSpPr>
+            <a:spLocks noGrp="1"/>
+          </p:cNvSpPr>
+          <p:nvPr>
+            <p:ph type="title"/>
+          </p:nvPr>
+        </p:nvSpPr>
+        <p:spPr/>
+        <p:txBody>
+          <a:bodyPr/>
+          <a:lstStyle/>
+          <a:p>
+            <a:r>
+              <a:rPr lang="en-US" dirty="0" smtClean="0">
+                <a:solidFill>
+                  <a:schemeClr val="tx1"/>
+                </a:solidFill>
+              </a:rPr>
+              <a:t>Architecture</a:t>
+            </a:r>
+            <a:endParaRPr lang="en-US" dirty="0">
+              <a:solidFill>
+                <a:schemeClr val="tx1"/>
+              </a:solidFill>
+            </a:endParaRPr>
+          </a:p>
+        </p:txBody>
+      </p:sp>
+      <p:pic>
+        <p:nvPicPr>
+          <p:cNvPr id="1027" name="Picture 3"/>
+          <p:cNvPicPr>
+            <a:picLocks noGrp="1" noChangeAspect="1" noChangeArrowheads="1"/>
+          </p:cNvPicPr>
+          <p:nvPr>
+            <p:ph sz="quarter" idx="1"/>
+          </p:nvPr>
+        </p:nvPicPr>
+        <p:blipFill>
+          <a:blip r:embed="rId2"/>
+          <a:srcRect/>
+          <a:stretch>
+            <a:fillRect/>
+          </a:stretch>
+        </p:blipFill>
+        <p:spPr bwMode="auto">
+          <a:xfrm>
+            <a:off x="762000" y="1807400"/>
+            <a:ext cx="6858000" cy="4459224"/>
+          </a:xfrm>
+          <a:prstGeom prst="rect">
+            <a:avLst/>
+          </a:prstGeom>
+          <a:noFill/>
+          <a:ln w="9525">
+            <a:noFill/>
+            <a:miter lim="800000"/>
+            <a:headEnd/>
+            <a:tailEnd/>
+          </a:ln>
+          <a:effectLst/>
+        </p:spPr>
+      </p:pic>
+    </p:spTree>
+  </p:cSld>
+  <p:clrMapOvr>
+    <a:masterClrMapping/>
+  </p:clrMapOvr>
+</p:sld>
+</file>
+
+<file path=ppt/slides/slide17.xml><?xml version="1.0" encoding="utf-8"?>
+<p:sld xmlns:a="http://schemas.openxmlformats.org/drawingml/2006/main" xmlns:r="http://schemas.openxmlformats.org/officeDocument/2006/relationships" xmlns:p="http://schemas.openxmlformats.org/presentationml/2006/main">
+  <p:cSld>
+    <p:spTree>
+      <p:nvGrpSpPr>
+        <p:cNvPr id="1" name=""/>
+        <p:cNvGrpSpPr/>
+        <p:nvPr/>
+      </p:nvGrpSpPr>
+      <p:grpSpPr>
+        <a:xfrm>
+          <a:off x="0" y="0"/>
+          <a:ext cx="0" cy="0"/>
+          <a:chOff x="0" y="0"/>
+          <a:chExt cx="0" cy="0"/>
+        </a:xfrm>
+      </p:grpSpPr>
+      <p:sp>
+        <p:nvSpPr>
+          <p:cNvPr id="2" name="Title 1"/>
+          <p:cNvSpPr>
+            <a:spLocks noGrp="1"/>
+          </p:cNvSpPr>
+          <p:nvPr>
+            <p:ph type="title"/>
+          </p:nvPr>
+        </p:nvSpPr>
+        <p:spPr/>
+        <p:txBody>
+          <a:bodyPr/>
+          <a:lstStyle/>
+          <a:p>
+            <a:r>
+              <a:rPr lang="en-US" dirty="0" smtClean="0">
+                <a:solidFill>
+                  <a:schemeClr val="tx1"/>
+                </a:solidFill>
+              </a:rPr>
+              <a:t>Use Case</a:t>
+            </a:r>
+            <a:endParaRPr lang="en-US" dirty="0">
+              <a:solidFill>
+                <a:schemeClr val="tx1"/>
+              </a:solidFill>
+            </a:endParaRPr>
+          </a:p>
+        </p:txBody>
+      </p:sp>
+      <p:sp>
+        <p:nvSpPr>
+          <p:cNvPr id="3" name="Content Placeholder 2"/>
+          <p:cNvSpPr>
+            <a:spLocks noGrp="1"/>
+          </p:cNvSpPr>
+          <p:nvPr>
+            <p:ph sz="quarter" idx="1"/>
+          </p:nvPr>
+        </p:nvSpPr>
+        <p:spPr/>
+        <p:txBody>
+          <a:bodyPr/>
+          <a:lstStyle/>
+          <a:p>
+            <a:pPr>
+              <a:buNone/>
+            </a:pPr>
+            <a:r>
+              <a:rPr lang="en-US" dirty="0" smtClean="0"/>
+              <a:t>Use case 1</a:t>
+            </a:r>
+          </a:p>
+          <a:p>
+            <a:r>
+              <a:rPr lang="en-US" dirty="0" smtClean="0"/>
+              <a:t>Patients to keep thier records of all appointments.</a:t>
+            </a:r>
+          </a:p>
+          <a:p>
+            <a:r>
+              <a:rPr lang="en-US" dirty="0" smtClean="0"/>
+              <a:t>Also useful for the patients who are unable to go to hospital.</a:t>
+            </a:r>
+          </a:p>
+          <a:p>
+            <a:endParaRPr lang="en-US" dirty="0" smtClean="0"/>
+          </a:p>
+          <a:p>
+            <a:pPr>
+              <a:buNone/>
+            </a:pPr>
+            <a:r>
+              <a:rPr lang="en-US" dirty="0" smtClean="0"/>
+              <a:t>Use case 2</a:t>
+            </a:r>
+          </a:p>
+          <a:p>
+            <a:r>
+              <a:rPr lang="en-US" dirty="0" smtClean="0"/>
+              <a:t>Hospital management to have records of all the appointments as well as prescription given by doctor along with patient details.</a:t>
+            </a:r>
+          </a:p>
+          <a:p>
+            <a:pPr>
+              <a:buNone/>
+            </a:pPr>
+            <a:endParaRPr lang="en-US" dirty="0" smtClean="0"/>
+          </a:p>
+        </p:txBody>
+      </p:sp>
+    </p:spTree>
+  </p:cSld>
+  <p:clrMapOvr>
+    <a:masterClrMapping/>
+  </p:clrMapOvr>
+</p:sld>
+</file>
+
+<file path=ppt/slides/slide18.xml><?xml version="1.0" encoding="utf-8"?>
+<p:sld xmlns:a="http://schemas.openxmlformats.org/drawingml/2006/main" xmlns:r="http://schemas.openxmlformats.org/officeDocument/2006/relationships" xmlns:p="http://schemas.openxmlformats.org/presentationml/2006/main">
+  <p:cSld>
+    <p:spTree>
+      <p:nvGrpSpPr>
+        <p:cNvPr id="1" name=""/>
+        <p:cNvGrpSpPr/>
+        <p:nvPr/>
+      </p:nvGrpSpPr>
+      <p:grpSpPr>
+        <a:xfrm>
+          <a:off x="0" y="0"/>
+          <a:ext cx="0" cy="0"/>
+          <a:chOff x="0" y="0"/>
+          <a:chExt cx="0" cy="0"/>
+        </a:xfrm>
+      </p:grpSpPr>
+      <p:sp>
+        <p:nvSpPr>
+          <p:cNvPr id="2" name="Title 1"/>
+          <p:cNvSpPr>
+            <a:spLocks noGrp="1"/>
+          </p:cNvSpPr>
+          <p:nvPr>
+            <p:ph type="title"/>
+          </p:nvPr>
+        </p:nvSpPr>
+        <p:spPr/>
+        <p:txBody>
+          <a:bodyPr/>
+          <a:lstStyle/>
+          <a:p>
+            <a:r>
+              <a:rPr lang="en-US" dirty="0" smtClean="0">
+                <a:solidFill>
+                  <a:schemeClr val="tx1"/>
+                </a:solidFill>
+              </a:rPr>
+              <a:t>Testing</a:t>
+            </a:r>
+            <a:endParaRPr lang="en-US" dirty="0">
+              <a:solidFill>
+                <a:schemeClr val="tx1"/>
+              </a:solidFill>
+            </a:endParaRPr>
+          </a:p>
+        </p:txBody>
+      </p:sp>
+      <p:sp>
+        <p:nvSpPr>
+          <p:cNvPr id="3" name="Content Placeholder 2"/>
+          <p:cNvSpPr>
+            <a:spLocks noGrp="1"/>
+          </p:cNvSpPr>
+          <p:nvPr>
+            <p:ph sz="quarter" idx="1"/>
+          </p:nvPr>
+        </p:nvSpPr>
+        <p:spPr>
+          <a:xfrm>
+            <a:off x="1066800" y="1905000"/>
+            <a:ext cx="6400800" cy="4267200"/>
+          </a:xfrm>
+        </p:spPr>
+        <p:txBody>
+          <a:bodyPr/>
+          <a:lstStyle/>
+          <a:p>
+            <a:r>
+              <a:rPr lang="en-US" dirty="0" smtClean="0"/>
+              <a:t>The tool used for testing is SonarLint.</a:t>
+            </a:r>
+          </a:p>
+          <a:p>
+            <a:r>
+              <a:rPr lang="en-US" dirty="0" smtClean="0"/>
+              <a:t>The code coverage is-</a:t>
+            </a:r>
+          </a:p>
+          <a:p>
+            <a:pPr>
+              <a:buNone/>
+            </a:pPr>
+            <a:r>
+              <a:rPr lang="en-US" dirty="0" smtClean="0"/>
+              <a:t>             Class     -   100%</a:t>
+            </a:r>
+          </a:p>
+          <a:p>
+            <a:pPr>
+              <a:buNone/>
+            </a:pPr>
+            <a:r>
+              <a:rPr lang="en-US" dirty="0" smtClean="0"/>
+              <a:t>             Method  -    81%</a:t>
+            </a:r>
+          </a:p>
+          <a:p>
+            <a:pPr>
+              <a:buNone/>
+            </a:pPr>
+            <a:r>
+              <a:rPr lang="en-US" dirty="0" smtClean="0"/>
+              <a:t>             Line       -    86%</a:t>
+            </a:r>
+          </a:p>
+          <a:p>
+            <a:endParaRPr lang="en-US" dirty="0"/>
+          </a:p>
+        </p:txBody>
+      </p:sp>
+    </p:spTree>
+  </p:cSld>
+  <p:clrMapOvr>
+    <a:masterClrMapping/>
+  </p:clrMapOvr>
+</p:sld>
+</file>
+
+<file path=ppt/slides/slide19.xml><?xml version="1.0" encoding="utf-8"?>
+<p:sld xmlns:a="http://schemas.openxmlformats.org/drawingml/2006/main" xmlns:r="http://schemas.openxmlformats.org/officeDocument/2006/relationships" xmlns:p="http://schemas.openxmlformats.org/presentationml/2006/main">
+  <p:cSld>
+    <p:spTree>
+      <p:nvGrpSpPr>
+        <p:cNvPr id="1" name=""/>
+        <p:cNvGrpSpPr/>
+        <p:nvPr/>
+      </p:nvGrpSpPr>
+      <p:grpSpPr>
+        <a:xfrm>
+          <a:off x="0" y="0"/>
+          <a:ext cx="0" cy="0"/>
+          <a:chOff x="0" y="0"/>
+          <a:chExt cx="0" cy="0"/>
+        </a:xfrm>
+      </p:grpSpPr>
+      <p:sp>
+        <p:nvSpPr>
+          <p:cNvPr id="2" name="Title 1"/>
+          <p:cNvSpPr>
+            <a:spLocks noGrp="1"/>
+          </p:cNvSpPr>
+          <p:nvPr>
+            <p:ph type="title"/>
+          </p:nvPr>
+        </p:nvSpPr>
+        <p:spPr/>
+        <p:txBody>
+          <a:bodyPr/>
+          <a:lstStyle/>
+          <a:p>
+            <a:r>
+              <a:rPr lang="en-US" dirty="0" smtClean="0">
+                <a:solidFill>
+                  <a:schemeClr val="tx1"/>
+                </a:solidFill>
+              </a:rPr>
+              <a:t>Swagger</a:t>
+            </a:r>
+            <a:endParaRPr lang="en-US" dirty="0">
+              <a:solidFill>
+                <a:schemeClr val="tx1"/>
+              </a:solidFill>
+            </a:endParaRPr>
+          </a:p>
+        </p:txBody>
+      </p:sp>
+      <p:pic>
+        <p:nvPicPr>
+          <p:cNvPr id="1026" name="Picture 2" descr="C:\Users\sfjbs\Pictures\Screenshots\Screenshot (13).png"/>
+          <p:cNvPicPr>
+            <a:picLocks noGrp="1" noChangeAspect="1" noChangeArrowheads="1"/>
+          </p:cNvPicPr>
+          <p:nvPr>
+            <p:ph sz="quarter" idx="1"/>
+          </p:nvPr>
+        </p:nvPicPr>
+        <p:blipFill>
+          <a:blip r:embed="rId2"/>
+          <a:srcRect/>
+          <a:stretch>
+            <a:fillRect/>
+          </a:stretch>
+        </p:blipFill>
+        <p:spPr bwMode="auto">
+          <a:xfrm>
+            <a:off x="457200" y="1936750"/>
+            <a:ext cx="7467600" cy="4200525"/>
+          </a:xfrm>
+          <a:prstGeom prst="rect">
+            <a:avLst/>
+          </a:prstGeom>
+          <a:noFill/>
+        </p:spPr>
+      </p:pic>
+    </p:spTree>
+  </p:cSld>
+  <p:clrMapOvr>
+    <a:masterClrMapping/>
+  </p:clrMapOvr>
+</p:sld>
+</file>
+
+<file path=ppt/slides/slide2.xml><?xml version="1.0" encoding="utf-8"?>
+<p:sld xmlns:a="http://schemas.openxmlformats.org/drawingml/2006/main" xmlns:r="http://schemas.openxmlformats.org/officeDocument/2006/relationships" xmlns:p="http://schemas.openxmlformats.org/presentationml/2006/main">
+  <p:cSld>
+    <p:spTree>
+      <p:nvGrpSpPr>
+        <p:cNvPr id="1" name=""/>
+        <p:cNvGrpSpPr/>
+        <p:nvPr/>
+      </p:nvGrpSpPr>
+      <p:grpSpPr>
+        <a:xfrm>
+          <a:off x="0" y="0"/>
+          <a:ext cx="0" cy="0"/>
+          <a:chOff x="0" y="0"/>
+          <a:chExt cx="0" cy="0"/>
+        </a:xfrm>
+      </p:grpSpPr>
+      <p:sp>
+        <p:nvSpPr>
+          <p:cNvPr id="2" name="Title 1"/>
+          <p:cNvSpPr>
+            <a:spLocks noGrp="1"/>
+          </p:cNvSpPr>
+          <p:nvPr>
+            <p:ph type="title"/>
+          </p:nvPr>
+        </p:nvSpPr>
+        <p:spPr/>
+        <p:txBody>
+          <a:bodyPr/>
+          <a:lstStyle/>
+          <a:p>
+            <a:r>
+              <a:rPr lang="en-US" dirty="0" smtClean="0">
+                <a:solidFill>
+                  <a:schemeClr val="tx1"/>
+                </a:solidFill>
+                <a:latin typeface="Goudy Old Style"/>
+              </a:rPr>
+              <a:t>Introduction</a:t>
+            </a:r>
+            <a:endParaRPr lang="en-US" dirty="0">
+              <a:solidFill>
+                <a:schemeClr val="tx1"/>
+              </a:solidFill>
+              <a:latin typeface="Goudy Old Style"/>
+            </a:endParaRPr>
+          </a:p>
+        </p:txBody>
+      </p:sp>
+      <p:sp>
+        <p:nvSpPr>
+          <p:cNvPr id="3" name="Content Placeholder 2"/>
+          <p:cNvSpPr>
+            <a:spLocks noGrp="1"/>
+          </p:cNvSpPr>
+          <p:nvPr>
+            <p:ph sz="quarter" idx="1"/>
+          </p:nvPr>
+        </p:nvSpPr>
+        <p:spPr>
+          <a:xfrm>
+            <a:off x="457200" y="1600200"/>
+            <a:ext cx="7467600" cy="5029200"/>
+          </a:xfrm>
+        </p:spPr>
+        <p:txBody>
+          <a:bodyPr>
+            <a:normAutofit lnSpcReduction="10000"/>
+          </a:bodyPr>
+          <a:lstStyle/>
+          <a:p>
+            <a:r>
+              <a:rPr lang="en-US" dirty="0" smtClean="0">
+                <a:latin typeface="Goudy Old Style"/>
+              </a:rPr>
+              <a:t>Hospital Management System brings together all the information and processes of a hospital, in a single platform. </a:t>
+            </a:r>
+          </a:p>
+          <a:p>
+            <a:pPr>
+              <a:buNone/>
+            </a:pPr>
+            <a:endParaRPr lang="en-US" dirty="0" smtClean="0">
+              <a:latin typeface="Goudy Old Style"/>
+            </a:endParaRPr>
+          </a:p>
+          <a:p>
+            <a:r>
+              <a:rPr lang="en-US" dirty="0" smtClean="0"/>
+              <a:t>Hospital management system is the inevitable part of the lifecycle of the modern medical institution. It automates numerous daily operations and enables smooth interactions of the users.</a:t>
+            </a:r>
+          </a:p>
+          <a:p>
+            <a:endParaRPr lang="en-US" dirty="0" smtClean="0">
+              <a:latin typeface="Goudy Old Style"/>
+            </a:endParaRPr>
+          </a:p>
+          <a:p>
+            <a:r>
+              <a:rPr lang="en-US" dirty="0" smtClean="0"/>
+              <a:t>The system automatically generates a highly-efficient process and makes it quick.</a:t>
+            </a:r>
+            <a:endParaRPr lang="en-US" dirty="0" smtClean="0">
+              <a:latin typeface="Goudy Old Style"/>
+            </a:endParaRPr>
+          </a:p>
+          <a:p>
+            <a:pPr>
+              <a:buNone/>
+            </a:pPr>
+            <a:r>
+              <a:rPr lang="en-US" dirty="0" smtClean="0"/>
+              <a:t/>
+            </a:r>
+            <a:br>
+              <a:rPr lang="en-US" dirty="0" smtClean="0"/>
+            </a:br>
+            <a:endParaRPr lang="en-US" dirty="0" smtClean="0"/>
+          </a:p>
+          <a:p>
+            <a:endParaRPr lang="en-US" dirty="0" smtClean="0"/>
+          </a:p>
+          <a:p>
+            <a:pPr>
+              <a:buNone/>
+            </a:pPr>
+            <a:endParaRPr lang="en-US" dirty="0" smtClean="0"/>
+          </a:p>
+          <a:p>
+            <a:endParaRPr lang="en-US" dirty="0">
+              <a:latin typeface="Goudy Old Style"/>
+            </a:endParaRPr>
+          </a:p>
+        </p:txBody>
+      </p:sp>
+    </p:spTree>
+  </p:cSld>
+  <p:clrMapOvr>
+    <a:masterClrMapping/>
+  </p:clrMapOvr>
+</p:sld>
+</file>
+
+<file path=ppt/slides/slide20.xml><?xml version="1.0" encoding="utf-8"?>
+<p:sld xmlns:a="http://schemas.openxmlformats.org/drawingml/2006/main" xmlns:r="http://schemas.openxmlformats.org/officeDocument/2006/relationships" xmlns:p="http://schemas.openxmlformats.org/presentationml/2006/main">
+  <p:cSld>
+    <p:spTree>
+      <p:nvGrpSpPr>
+        <p:cNvPr id="1" name=""/>
+        <p:cNvGrpSpPr/>
+        <p:nvPr/>
+      </p:nvGrpSpPr>
+      <p:grpSpPr>
+        <a:xfrm>
+          <a:off x="0" y="0"/>
+          <a:ext cx="0" cy="0"/>
+          <a:chOff x="0" y="0"/>
+          <a:chExt cx="0" cy="0"/>
+        </a:xfrm>
+      </p:grpSpPr>
+      <p:pic>
+        <p:nvPicPr>
+          <p:cNvPr id="2050" name="Picture 2" descr="C:\Users\sfjbs\Pictures\Screenshots\Screenshot (14).png"/>
+          <p:cNvPicPr>
+            <a:picLocks noGrp="1" noChangeAspect="1" noChangeArrowheads="1"/>
+          </p:cNvPicPr>
+          <p:nvPr>
+            <p:ph sz="quarter" idx="1"/>
+          </p:nvPr>
+        </p:nvPicPr>
+        <p:blipFill>
+          <a:blip r:embed="rId2"/>
+          <a:srcRect/>
+          <a:stretch>
+            <a:fillRect/>
+          </a:stretch>
+        </p:blipFill>
+        <p:spPr bwMode="auto">
+          <a:xfrm>
+            <a:off x="457200" y="1250950"/>
+            <a:ext cx="7467600" cy="4200525"/>
+          </a:xfrm>
+          <a:prstGeom prst="rect">
+            <a:avLst/>
+          </a:prstGeom>
+          <a:noFill/>
+        </p:spPr>
+      </p:pic>
+    </p:spTree>
+  </p:cSld>
+  <p:clrMapOvr>
+    <a:masterClrMapping/>
+  </p:clrMapOvr>
+  <p:timing>
+    <p:tnLst>
+      <p:par>
+        <p:cTn id="1" dur="indefinite" restart="never" nodeType="tmRoot"/>
+      </p:par>
+    </p:tnLst>
+  </p:timing>
+</p:sld>
+</file>
+
+<file path=ppt/slides/slide21.xml><?xml version="1.0" encoding="utf-8"?>
 <p:sld xmlns:a="http://schemas.openxmlformats.org/drawingml/2006/main" xmlns:r="http://schemas.openxmlformats.org/officeDocument/2006/relationships" xmlns:p="http://schemas.openxmlformats.org/presentationml/2006/main">
   <p:cSld>
     <p:spTree>
@@ -5907,150 +6439,13 @@
   <p:clrMapOvr>
     <a:masterClrMapping/>
   </p:clrMapOvr>
-</p:sld>
-</file>
-
-<file path=ppt/slides/slide2.xml><?xml version="1.0" encoding="utf-8"?>
-<p:sld xmlns:a="http://schemas.openxmlformats.org/drawingml/2006/main" xmlns:r="http://schemas.openxmlformats.org/officeDocument/2006/relationships" xmlns:p="http://schemas.openxmlformats.org/presentationml/2006/main">
-  <p:cSld>
-    <p:spTree>
-      <p:nvGrpSpPr>
-        <p:cNvPr id="1" name=""/>
-        <p:cNvGrpSpPr/>
-        <p:nvPr/>
-      </p:nvGrpSpPr>
-      <p:grpSpPr>
-        <a:xfrm>
-          <a:off x="0" y="0"/>
-          <a:ext cx="0" cy="0"/>
-          <a:chOff x="0" y="0"/>
-          <a:chExt cx="0" cy="0"/>
-        </a:xfrm>
-      </p:grpSpPr>
-      <p:sp>
-        <p:nvSpPr>
-          <p:cNvPr id="2" name="Title 1"/>
-          <p:cNvSpPr>
-            <a:spLocks noGrp="1"/>
-          </p:cNvSpPr>
-          <p:nvPr>
-            <p:ph type="title"/>
-          </p:nvPr>
-        </p:nvSpPr>
-        <p:spPr/>
-        <p:txBody>
-          <a:bodyPr/>
-          <a:lstStyle/>
-          <a:p>
-            <a:r>
-              <a:rPr lang="en-US" dirty="0" smtClean="0">
-                <a:solidFill>
-                  <a:schemeClr val="tx1"/>
-                </a:solidFill>
-                <a:latin typeface="Goudy Old Style"/>
-              </a:rPr>
-              <a:t>Introduction</a:t>
-            </a:r>
-            <a:endParaRPr lang="en-US" dirty="0">
-              <a:solidFill>
-                <a:schemeClr val="tx1"/>
-              </a:solidFill>
-              <a:latin typeface="Goudy Old Style"/>
-            </a:endParaRPr>
-          </a:p>
-        </p:txBody>
-      </p:sp>
-      <p:sp>
-        <p:nvSpPr>
-          <p:cNvPr id="3" name="Content Placeholder 2"/>
-          <p:cNvSpPr>
-            <a:spLocks noGrp="1"/>
-          </p:cNvSpPr>
-          <p:nvPr>
-            <p:ph sz="quarter" idx="1"/>
-          </p:nvPr>
-        </p:nvSpPr>
-        <p:spPr>
-          <a:xfrm>
-            <a:off x="457200" y="1600200"/>
-            <a:ext cx="7467600" cy="5029200"/>
-          </a:xfrm>
-        </p:spPr>
-        <p:txBody>
-          <a:bodyPr>
-            <a:normAutofit lnSpcReduction="10000"/>
-          </a:bodyPr>
-          <a:lstStyle/>
-          <a:p>
-            <a:r>
-              <a:rPr lang="en-US" dirty="0" smtClean="0">
-                <a:latin typeface="Goudy Old Style"/>
-              </a:rPr>
-              <a:t>Hospital Management System brings together all the information and processes of a hospital, in a single platform. </a:t>
-            </a:r>
-          </a:p>
-          <a:p>
-            <a:pPr>
-              <a:buNone/>
-            </a:pPr>
-            <a:endParaRPr lang="en-US" dirty="0" smtClean="0">
-              <a:latin typeface="Goudy Old Style"/>
-            </a:endParaRPr>
-          </a:p>
-          <a:p>
-            <a:r>
-              <a:rPr lang="en-US" dirty="0" smtClean="0"/>
-              <a:t>Hospital management system is the inevitable part of the lifecycle of the modern medical institution. It automates numerous daily operations and enables smooth interactions of the users.</a:t>
-            </a:r>
-          </a:p>
-          <a:p>
-            <a:endParaRPr lang="en-US" dirty="0" smtClean="0">
-              <a:latin typeface="Goudy Old Style"/>
-            </a:endParaRPr>
-          </a:p>
-          <a:p>
-            <a:r>
-              <a:rPr lang="en-US" dirty="0" smtClean="0"/>
-              <a:t>The system automatically generates a highly-efficient process and makes it quick.</a:t>
-            </a:r>
-            <a:endParaRPr lang="en-US" dirty="0" smtClean="0">
-              <a:latin typeface="Goudy Old Style"/>
-            </a:endParaRPr>
-          </a:p>
-          <a:p>
-            <a:pPr>
-              <a:buNone/>
-            </a:pPr>
-            <a:r>
-              <a:rPr lang="en-US" dirty="0" smtClean="0"/>
-              <a:t/>
-            </a:r>
-            <a:br>
-              <a:rPr lang="en-US" dirty="0" smtClean="0"/>
-            </a:br>
-            <a:endParaRPr lang="en-US" dirty="0" smtClean="0"/>
-          </a:p>
-          <a:p>
-            <a:endParaRPr lang="en-US" dirty="0" smtClean="0"/>
-          </a:p>
-          <a:p>
-            <a:pPr>
-              <a:buNone/>
-            </a:pPr>
-            <a:endParaRPr lang="en-US" dirty="0" smtClean="0"/>
-          </a:p>
-          <a:p>
-            <a:endParaRPr lang="en-US" dirty="0">
-              <a:latin typeface="Goudy Old Style"/>
-            </a:endParaRPr>
-          </a:p>
-        </p:txBody>
-      </p:sp>
-    </p:spTree>
-  </p:cSld>
-  <p:clrMapOvr>
-    <a:masterClrMapping/>
-  </p:clrMapOvr>
+  <p:timing>
+    <p:tnLst>
+      <p:par>
+        <p:cTn id="1" dur="indefinite" restart="never" nodeType="tmRoot"/>
+      </p:par>
+    </p:tnLst>
+  </p:timing>
 </p:sld>
 </file>
 

</xml_diff>